<commit_message>
last day of lab
</commit_message>
<xml_diff>
--- a/grocers project.pptx
+++ b/grocers project.pptx
@@ -120,6 +120,11 @@
       </a:defRPr>
     </a:lvl9pPr>
   </p:defaultTextStyle>
+  <p:extLst>
+    <p:ext uri="{EFAFB233-063F-42B5-8137-9DF3F51BA10A}">
+      <p15:sldGuideLst xmlns:p15="http://schemas.microsoft.com/office/powerpoint/2012/main"/>
+    </p:ext>
+  </p:extLst>
 </p:presentation>
 </file>
 
@@ -3848,6 +3853,30 @@
           </a:prstGeom>
         </p:spPr>
       </p:pic>
+      <p:pic>
+        <p:nvPicPr>
+          <p:cNvPr id="3" name="Picture 2"/>
+          <p:cNvPicPr>
+            <a:picLocks noChangeAspect="1"/>
+          </p:cNvPicPr>
+          <p:nvPr/>
+        </p:nvPicPr>
+        <p:blipFill>
+          <a:blip r:embed="rId3"/>
+          <a:stretch>
+            <a:fillRect/>
+          </a:stretch>
+        </p:blipFill>
+        <p:spPr>
+          <a:xfrm>
+            <a:off x="2028825" y="1414462"/>
+            <a:ext cx="8134350" cy="4029075"/>
+          </a:xfrm>
+          <a:prstGeom prst="rect">
+            <a:avLst/>
+          </a:prstGeom>
+        </p:spPr>
+      </p:pic>
     </p:spTree>
     <p:extLst>
       <p:ext uri="{BB962C8B-B14F-4D97-AF65-F5344CB8AC3E}">
@@ -3930,6 +3959,30 @@
           <a:xfrm>
             <a:off x="10983764" y="5684244"/>
             <a:ext cx="1208236" cy="1173756"/>
+          </a:xfrm>
+          <a:prstGeom prst="rect">
+            <a:avLst/>
+          </a:prstGeom>
+        </p:spPr>
+      </p:pic>
+      <p:pic>
+        <p:nvPicPr>
+          <p:cNvPr id="3" name="Picture 2"/>
+          <p:cNvPicPr>
+            <a:picLocks noChangeAspect="1"/>
+          </p:cNvPicPr>
+          <p:nvPr/>
+        </p:nvPicPr>
+        <p:blipFill>
+          <a:blip r:embed="rId3"/>
+          <a:stretch>
+            <a:fillRect/>
+          </a:stretch>
+        </p:blipFill>
+        <p:spPr>
+          <a:xfrm>
+            <a:off x="714375" y="1252537"/>
+            <a:ext cx="10763250" cy="4352925"/>
           </a:xfrm>
           <a:prstGeom prst="rect">
             <a:avLst/>
@@ -4024,6 +4077,30 @@
           </a:prstGeom>
         </p:spPr>
       </p:pic>
+      <p:pic>
+        <p:nvPicPr>
+          <p:cNvPr id="3" name="Picture 2"/>
+          <p:cNvPicPr>
+            <a:picLocks noChangeAspect="1"/>
+          </p:cNvPicPr>
+          <p:nvPr/>
+        </p:nvPicPr>
+        <p:blipFill>
+          <a:blip r:embed="rId3"/>
+          <a:stretch>
+            <a:fillRect/>
+          </a:stretch>
+        </p:blipFill>
+        <p:spPr>
+          <a:xfrm>
+            <a:off x="2052637" y="1733550"/>
+            <a:ext cx="8086725" cy="3390900"/>
+          </a:xfrm>
+          <a:prstGeom prst="rect">
+            <a:avLst/>
+          </a:prstGeom>
+        </p:spPr>
+      </p:pic>
     </p:spTree>
     <p:extLst>
       <p:ext uri="{BB962C8B-B14F-4D97-AF65-F5344CB8AC3E}">
@@ -4106,6 +4183,30 @@
           <a:xfrm>
             <a:off x="10983764" y="5684244"/>
             <a:ext cx="1208236" cy="1173756"/>
+          </a:xfrm>
+          <a:prstGeom prst="rect">
+            <a:avLst/>
+          </a:prstGeom>
+        </p:spPr>
+      </p:pic>
+      <p:pic>
+        <p:nvPicPr>
+          <p:cNvPr id="3" name="Picture 2"/>
+          <p:cNvPicPr>
+            <a:picLocks noChangeAspect="1"/>
+          </p:cNvPicPr>
+          <p:nvPr/>
+        </p:nvPicPr>
+        <p:blipFill>
+          <a:blip r:embed="rId3"/>
+          <a:stretch>
+            <a:fillRect/>
+          </a:stretch>
+        </p:blipFill>
+        <p:spPr>
+          <a:xfrm>
+            <a:off x="652462" y="1395412"/>
+            <a:ext cx="10887075" cy="4067175"/>
           </a:xfrm>
           <a:prstGeom prst="rect">
             <a:avLst/>
@@ -5010,11 +5111,7 @@
           <a:p>
             <a:r>
               <a:rPr lang="en-CA" dirty="0" smtClean="0"/>
-              <a:t>Admin</a:t>
-            </a:r>
-            <a:r>
-              <a:rPr lang="en-CA" dirty="0" smtClean="0"/>
-              <a:t> Services</a:t>
+              <a:t>Admin Services</a:t>
             </a:r>
             <a:endParaRPr lang="en-IN" dirty="0"/>
           </a:p>
@@ -5206,11 +5303,7 @@
           <a:p>
             <a:r>
               <a:rPr lang="en-CA" dirty="0" smtClean="0"/>
-              <a:t>Usual </a:t>
-            </a:r>
-            <a:r>
-              <a:rPr lang="en-CA" dirty="0" smtClean="0"/>
-              <a:t>customers</a:t>
+              <a:t>Usual customers</a:t>
             </a:r>
           </a:p>
           <a:p>
@@ -5253,13 +5346,8 @@
             <a:pPr lvl="2"/>
             <a:r>
               <a:rPr lang="en-CA" dirty="0" smtClean="0"/>
-              <a:t>20% of </a:t>
-            </a:r>
-            <a:r>
-              <a:rPr lang="en-CA" dirty="0" smtClean="0"/>
-              <a:t>customer</a:t>
-            </a:r>
-            <a:endParaRPr lang="en-CA" dirty="0" smtClean="0"/>
+              <a:t>20% of customer</a:t>
+            </a:r>
           </a:p>
         </p:txBody>
       </p:sp>
@@ -5770,6 +5858,30 @@
           </a:prstGeom>
         </p:spPr>
       </p:pic>
+      <p:pic>
+        <p:nvPicPr>
+          <p:cNvPr id="3" name="Picture 2"/>
+          <p:cNvPicPr>
+            <a:picLocks noChangeAspect="1"/>
+          </p:cNvPicPr>
+          <p:nvPr/>
+        </p:nvPicPr>
+        <p:blipFill>
+          <a:blip r:embed="rId3"/>
+          <a:stretch>
+            <a:fillRect/>
+          </a:stretch>
+        </p:blipFill>
+        <p:spPr>
+          <a:xfrm>
+            <a:off x="2180492" y="1038225"/>
+            <a:ext cx="6087208" cy="4781550"/>
+          </a:xfrm>
+          <a:prstGeom prst="rect">
+            <a:avLst/>
+          </a:prstGeom>
+        </p:spPr>
+      </p:pic>
     </p:spTree>
     <p:extLst>
       <p:ext uri="{BB962C8B-B14F-4D97-AF65-F5344CB8AC3E}">
@@ -5852,6 +5964,30 @@
           <a:xfrm>
             <a:off x="10983764" y="5684244"/>
             <a:ext cx="1208236" cy="1173756"/>
+          </a:xfrm>
+          <a:prstGeom prst="rect">
+            <a:avLst/>
+          </a:prstGeom>
+        </p:spPr>
+      </p:pic>
+      <p:pic>
+        <p:nvPicPr>
+          <p:cNvPr id="3" name="Picture 2"/>
+          <p:cNvPicPr>
+            <a:picLocks noChangeAspect="1"/>
+          </p:cNvPicPr>
+          <p:nvPr/>
+        </p:nvPicPr>
+        <p:blipFill>
+          <a:blip r:embed="rId3"/>
+          <a:stretch>
+            <a:fillRect/>
+          </a:stretch>
+        </p:blipFill>
+        <p:spPr>
+          <a:xfrm>
+            <a:off x="1743075" y="1333500"/>
+            <a:ext cx="8705850" cy="4191000"/>
           </a:xfrm>
           <a:prstGeom prst="rect">
             <a:avLst/>
@@ -5940,6 +6076,30 @@
           <a:xfrm>
             <a:off x="10983764" y="5684244"/>
             <a:ext cx="1208236" cy="1173756"/>
+          </a:xfrm>
+          <a:prstGeom prst="rect">
+            <a:avLst/>
+          </a:prstGeom>
+        </p:spPr>
+      </p:pic>
+      <p:pic>
+        <p:nvPicPr>
+          <p:cNvPr id="3" name="Picture 2"/>
+          <p:cNvPicPr>
+            <a:picLocks noChangeAspect="1"/>
+          </p:cNvPicPr>
+          <p:nvPr/>
+        </p:nvPicPr>
+        <p:blipFill>
+          <a:blip r:embed="rId3"/>
+          <a:stretch>
+            <a:fillRect/>
+          </a:stretch>
+        </p:blipFill>
+        <p:spPr>
+          <a:xfrm>
+            <a:off x="852487" y="1285875"/>
+            <a:ext cx="10487025" cy="4286250"/>
           </a:xfrm>
           <a:prstGeom prst="rect">
             <a:avLst/>

</xml_diff>